<commit_message>
Upd diags and docs
</commit_message>
<xml_diff>
--- a/ИУ7-85Б_Зуев_През_ВКР_4версия.pptx
+++ b/ИУ7-85Б_Зуев_През_ВКР_4версия.pptx
@@ -215,7 +215,7 @@
           <a:p>
             <a:fld id="{8361932B-7682-40F8-B7CC-B5DCDEF0DC88}" type="datetimeFigureOut">
               <a:rPr lang="ru-RU" smtClean="0"/>
-              <a:t>16.06.2025</a:t>
+              <a:t>19.06.2025</a:t>
             </a:fld>
             <a:endParaRPr lang="ru-RU"/>
           </a:p>
@@ -697,7 +697,7 @@
           <a:p>
             <a:fld id="{47C327EC-E918-46DA-965A-D89F60CE73F2}" type="datetime1">
               <a:rPr lang="ru-RU" smtClean="0"/>
-              <a:t>16.06.2025</a:t>
+              <a:t>19.06.2025</a:t>
             </a:fld>
             <a:endParaRPr lang="ru-RU"/>
           </a:p>
@@ -867,7 +867,7 @@
           <a:p>
             <a:fld id="{9FB30949-1A9C-4893-9C09-B131864ABCA3}" type="datetime1">
               <a:rPr lang="ru-RU" smtClean="0"/>
-              <a:t>16.06.2025</a:t>
+              <a:t>19.06.2025</a:t>
             </a:fld>
             <a:endParaRPr lang="ru-RU"/>
           </a:p>
@@ -1047,7 +1047,7 @@
           <a:p>
             <a:fld id="{FC553BE8-660E-437B-BBE9-1D704701F54F}" type="datetime1">
               <a:rPr lang="ru-RU" smtClean="0"/>
-              <a:t>16.06.2025</a:t>
+              <a:t>19.06.2025</a:t>
             </a:fld>
             <a:endParaRPr lang="ru-RU"/>
           </a:p>
@@ -1217,7 +1217,7 @@
           <a:p>
             <a:fld id="{F60B5145-3885-4A9A-A22F-280984127DDD}" type="datetime1">
               <a:rPr lang="ru-RU" smtClean="0"/>
-              <a:t>16.06.2025</a:t>
+              <a:t>19.06.2025</a:t>
             </a:fld>
             <a:endParaRPr lang="ru-RU"/>
           </a:p>
@@ -1461,7 +1461,7 @@
           <a:p>
             <a:fld id="{DFB1535F-AFA2-4FA1-ACF1-11B23421BF73}" type="datetime1">
               <a:rPr lang="ru-RU" smtClean="0"/>
-              <a:t>16.06.2025</a:t>
+              <a:t>19.06.2025</a:t>
             </a:fld>
             <a:endParaRPr lang="ru-RU"/>
           </a:p>
@@ -1693,7 +1693,7 @@
           <a:p>
             <a:fld id="{69FE8D11-6AF3-46D5-8134-DBAFFEC4197E}" type="datetime1">
               <a:rPr lang="ru-RU" smtClean="0"/>
-              <a:t>16.06.2025</a:t>
+              <a:t>19.06.2025</a:t>
             </a:fld>
             <a:endParaRPr lang="ru-RU"/>
           </a:p>
@@ -2060,7 +2060,7 @@
           <a:p>
             <a:fld id="{DD7EE7BD-992D-4A1A-B33E-CA0F036EB7A1}" type="datetime1">
               <a:rPr lang="ru-RU" smtClean="0"/>
-              <a:t>16.06.2025</a:t>
+              <a:t>19.06.2025</a:t>
             </a:fld>
             <a:endParaRPr lang="ru-RU"/>
           </a:p>
@@ -2178,7 +2178,7 @@
           <a:p>
             <a:fld id="{5F39BB8A-F253-41C5-BE3D-51D199F10B4A}" type="datetime1">
               <a:rPr lang="ru-RU" smtClean="0"/>
-              <a:t>16.06.2025</a:t>
+              <a:t>19.06.2025</a:t>
             </a:fld>
             <a:endParaRPr lang="ru-RU"/>
           </a:p>
@@ -2273,7 +2273,7 @@
           <a:p>
             <a:fld id="{D0D57DE5-A8CD-4548-BD47-6B1F22D177A3}" type="datetime1">
               <a:rPr lang="ru-RU" smtClean="0"/>
-              <a:t>16.06.2025</a:t>
+              <a:t>19.06.2025</a:t>
             </a:fld>
             <a:endParaRPr lang="ru-RU"/>
           </a:p>
@@ -2550,7 +2550,7 @@
           <a:p>
             <a:fld id="{6ED3CB4D-880D-431A-AC19-5175B8AE3CAF}" type="datetime1">
               <a:rPr lang="ru-RU" smtClean="0"/>
-              <a:t>16.06.2025</a:t>
+              <a:t>19.06.2025</a:t>
             </a:fld>
             <a:endParaRPr lang="ru-RU"/>
           </a:p>
@@ -2807,7 +2807,7 @@
           <a:p>
             <a:fld id="{176FB70E-976A-4BE1-AC6A-77A269007F64}" type="datetime1">
               <a:rPr lang="ru-RU" smtClean="0"/>
-              <a:t>16.06.2025</a:t>
+              <a:t>19.06.2025</a:t>
             </a:fld>
             <a:endParaRPr lang="ru-RU"/>
           </a:p>
@@ -3020,7 +3020,7 @@
           <a:p>
             <a:fld id="{5B845AB5-3C3D-409C-A34B-211DA3C6C40A}" type="datetime1">
               <a:rPr lang="ru-RU" smtClean="0"/>
-              <a:t>16.06.2025</a:t>
+              <a:t>19.06.2025</a:t>
             </a:fld>
             <a:endParaRPr lang="ru-RU"/>
           </a:p>
@@ -3682,8 +3682,8 @@
           </a:p>
         </p:txBody>
       </p:sp>
-      <mc:AlternateContent xmlns:mc="http://schemas.openxmlformats.org/markup-compatibility/2006">
-        <mc:Choice xmlns:a14="http://schemas.microsoft.com/office/drawing/2010/main" Requires="a14">
+      <mc:AlternateContent xmlns:mc="http://schemas.openxmlformats.org/markup-compatibility/2006" xmlns:a14="http://schemas.microsoft.com/office/drawing/2010/main">
+        <mc:Choice Requires="a14">
           <p:sp>
             <p:nvSpPr>
               <p:cNvPr id="5" name="Объект 4">
@@ -4223,7 +4223,7 @@
             </p:txBody>
           </p:sp>
         </mc:Choice>
-        <mc:Fallback>
+        <mc:Fallback xmlns="">
           <p:sp>
             <p:nvSpPr>
               <p:cNvPr id="5" name="Объект 4">
@@ -6000,7 +6000,7 @@
             <p:spPr>
               <a:xfrm>
                 <a:off x="203735" y="705462"/>
-                <a:ext cx="5259905" cy="6069995"/>
+                <a:ext cx="5357310" cy="5792996"/>
               </a:xfrm>
               <a:prstGeom prst="rect">
                 <a:avLst/>
@@ -6604,7 +6604,7 @@
             <p:spPr>
               <a:xfrm>
                 <a:off x="203735" y="705462"/>
-                <a:ext cx="5259905" cy="6069995"/>
+                <a:ext cx="5357310" cy="5792996"/>
               </a:xfrm>
               <a:prstGeom prst="rect">
                 <a:avLst/>
@@ -6612,7 +6612,7 @@
               <a:blipFill>
                 <a:blip r:embed="rId3"/>
                 <a:stretch>
-                  <a:fillRect l="-927" t="-101"/>
+                  <a:fillRect l="-910" t="-105"/>
                 </a:stretch>
               </a:blipFill>
             </p:spPr>
@@ -6645,7 +6645,7 @@
         </p:nvSpPr>
         <p:spPr>
           <a:xfrm>
-            <a:off x="5813660" y="1478303"/>
+            <a:off x="5813659" y="1468972"/>
             <a:ext cx="3888606" cy="4247317"/>
           </a:xfrm>
           <a:prstGeom prst="rect">
@@ -7495,12 +7495,10 @@
             </a:endParaRPr>
           </a:p>
           <a:p>
-            <a:pPr marL="342900" lvl="0" indent="-342900" algn="just">
+            <a:pPr lvl="0" algn="just">
               <a:lnSpc>
                 <a:spcPct val="120000"/>
               </a:lnSpc>
-              <a:buFont typeface="Symbol" panose="05050102010706020507" pitchFamily="18" charset="2"/>
-              <a:buChar char=""/>
             </a:pPr>
             <a:r>
               <a:rPr lang="ru-RU" sz="1800" dirty="0">
@@ -7542,12 +7540,10 @@
             </a:r>
           </a:p>
           <a:p>
-            <a:pPr marL="342900" lvl="0" indent="-342900" algn="just">
+            <a:pPr lvl="0" algn="just">
               <a:lnSpc>
                 <a:spcPct val="120000"/>
               </a:lnSpc>
-              <a:buFont typeface="Symbol" panose="05050102010706020507" pitchFamily="18" charset="2"/>
-              <a:buChar char=""/>
             </a:pPr>
             <a:r>
               <a:rPr lang="ru-RU" sz="1800" dirty="0">
@@ -7559,12 +7555,10 @@
             </a:r>
           </a:p>
           <a:p>
-            <a:pPr marL="342900" lvl="0" indent="-342900" algn="just">
+            <a:pPr lvl="0" algn="just">
               <a:lnSpc>
                 <a:spcPct val="120000"/>
               </a:lnSpc>
-              <a:buFont typeface="Symbol" panose="05050102010706020507" pitchFamily="18" charset="2"/>
-              <a:buChar char=""/>
             </a:pPr>
             <a:r>
               <a:rPr lang="ru-RU" sz="1800" dirty="0">
@@ -7589,12 +7583,10 @@
             </a:endParaRPr>
           </a:p>
           <a:p>
-            <a:pPr marL="342900" lvl="0" indent="-342900" algn="just">
+            <a:pPr algn="just">
               <a:lnSpc>
                 <a:spcPct val="120000"/>
               </a:lnSpc>
-              <a:buFont typeface="Symbol" panose="05050102010706020507" pitchFamily="18" charset="2"/>
-              <a:buChar char=""/>
             </a:pPr>
             <a:r>
               <a:rPr lang="ru-RU" sz="1800" dirty="0">
@@ -8133,25 +8125,28 @@
               <a:t> работы является </a:t>
             </a:r>
             <a:r>
+              <a:rPr lang="ru-RU" sz="2000">
+                <a:effectLst/>
+                <a:latin typeface="Times New Roman" panose="02020603050405020304" pitchFamily="18" charset="0"/>
+                <a:ea typeface="Times New Roman" panose="02020603050405020304" pitchFamily="18" charset="0"/>
+              </a:rPr>
+              <a:t>разработка метода </a:t>
+            </a:r>
+            <a:r>
               <a:rPr lang="ru-RU" sz="2000" dirty="0">
                 <a:effectLst/>
                 <a:latin typeface="Times New Roman" panose="02020603050405020304" pitchFamily="18" charset="0"/>
                 <a:ea typeface="Times New Roman" panose="02020603050405020304" pitchFamily="18" charset="0"/>
               </a:rPr>
-              <a:t>разработка метод нормализации в реляционных базах данных с использованием анализа функциональных зависимостей.</a:t>
+              <a:t>нормализации в реляционных базах данных с использованием анализа функциональных зависимостей.</a:t>
             </a:r>
             <a:r>
-              <a:rPr lang="ru-RU" sz="2000" b="1" dirty="0">
+              <a:rPr lang="ru-RU" sz="2000" b="1">
                 <a:latin typeface="Times New Roman" panose="02020603050405020304" pitchFamily="18" charset="0"/>
                 <a:cs typeface="Times New Roman" panose="02020603050405020304" pitchFamily="18" charset="0"/>
               </a:rPr>
               <a:t>	</a:t>
             </a:r>
-          </a:p>
-          <a:p>
-            <a:pPr marL="0" indent="0">
-              <a:buNone/>
-            </a:pPr>
             <a:endParaRPr lang="ru-RU" sz="2000" b="1" dirty="0">
               <a:latin typeface="Times New Roman" panose="02020603050405020304" pitchFamily="18" charset="0"/>
               <a:cs typeface="Times New Roman" panose="02020603050405020304" pitchFamily="18" charset="0"/>
@@ -8395,8 +8390,8 @@
           </a:p>
         </p:txBody>
       </p:sp>
-      <mc:AlternateContent xmlns:mc="http://schemas.openxmlformats.org/markup-compatibility/2006">
-        <mc:Choice xmlns:a14="http://schemas.microsoft.com/office/drawing/2010/main" Requires="a14">
+      <mc:AlternateContent xmlns:mc="http://schemas.openxmlformats.org/markup-compatibility/2006" xmlns:a14="http://schemas.microsoft.com/office/drawing/2010/main">
+        <mc:Choice Requires="a14">
           <p:sp>
             <p:nvSpPr>
               <p:cNvPr id="5" name="Объект 4"/>
@@ -9694,7 +9689,7 @@
             </p:txBody>
           </p:sp>
         </mc:Choice>
-        <mc:Fallback>
+        <mc:Fallback xmlns="">
           <p:sp>
             <p:nvSpPr>
               <p:cNvPr id="5" name="Объект 4"/>
@@ -10380,8 +10375,8 @@
           </a:p>
         </p:txBody>
       </p:sp>
-      <mc:AlternateContent xmlns:mc="http://schemas.openxmlformats.org/markup-compatibility/2006">
-        <mc:Choice xmlns:a14="http://schemas.microsoft.com/office/drawing/2010/main" Requires="a14">
+      <mc:AlternateContent xmlns:mc="http://schemas.openxmlformats.org/markup-compatibility/2006" xmlns:a14="http://schemas.microsoft.com/office/drawing/2010/main">
+        <mc:Choice Requires="a14">
           <p:sp>
             <p:nvSpPr>
               <p:cNvPr id="5" name="Объект 4"/>
@@ -11166,7 +11161,7 @@
             </p:txBody>
           </p:sp>
         </mc:Choice>
-        <mc:Fallback>
+        <mc:Fallback xmlns="">
           <p:sp>
             <p:nvSpPr>
               <p:cNvPr id="5" name="Объект 4"/>
@@ -13669,8 +13664,8 @@
           </a:p>
         </p:txBody>
       </p:sp>
-      <mc:AlternateContent xmlns:mc="http://schemas.openxmlformats.org/markup-compatibility/2006">
-        <mc:Choice xmlns:a14="http://schemas.microsoft.com/office/drawing/2010/main" Requires="a14">
+      <mc:AlternateContent xmlns:mc="http://schemas.openxmlformats.org/markup-compatibility/2006" xmlns:a14="http://schemas.microsoft.com/office/drawing/2010/main">
+        <mc:Choice Requires="a14">
           <p:sp>
             <p:nvSpPr>
               <p:cNvPr id="7" name="TextBox 6">
@@ -14093,7 +14088,7 @@
             </p:txBody>
           </p:sp>
         </mc:Choice>
-        <mc:Fallback>
+        <mc:Fallback xmlns="">
           <p:sp>
             <p:nvSpPr>
               <p:cNvPr id="7" name="TextBox 6">
@@ -15359,8 +15354,8 @@
           </a:p>
         </p:txBody>
       </p:sp>
-      <mc:AlternateContent xmlns:mc="http://schemas.openxmlformats.org/markup-compatibility/2006">
-        <mc:Choice xmlns:a14="http://schemas.microsoft.com/office/drawing/2010/main" Requires="a14">
+      <mc:AlternateContent xmlns:mc="http://schemas.openxmlformats.org/markup-compatibility/2006" xmlns:a14="http://schemas.microsoft.com/office/drawing/2010/main">
+        <mc:Choice Requires="a14">
           <p:sp>
             <p:nvSpPr>
               <p:cNvPr id="18" name="TextBox 17">
@@ -15538,7 +15533,7 @@
             </p:txBody>
           </p:sp>
         </mc:Choice>
-        <mc:Fallback>
+        <mc:Fallback xmlns="">
           <p:sp>
             <p:nvSpPr>
               <p:cNvPr id="18" name="TextBox 17">
@@ -15583,8 +15578,8 @@
           </p:sp>
         </mc:Fallback>
       </mc:AlternateContent>
-      <mc:AlternateContent xmlns:mc="http://schemas.openxmlformats.org/markup-compatibility/2006">
-        <mc:Choice xmlns:a14="http://schemas.microsoft.com/office/drawing/2010/main" Requires="a14">
+      <mc:AlternateContent xmlns:mc="http://schemas.openxmlformats.org/markup-compatibility/2006" xmlns:a14="http://schemas.microsoft.com/office/drawing/2010/main">
+        <mc:Choice Requires="a14">
           <p:sp>
             <p:nvSpPr>
               <p:cNvPr id="22" name="TextBox 21">
@@ -15763,7 +15758,7 @@
             </p:txBody>
           </p:sp>
         </mc:Choice>
-        <mc:Fallback>
+        <mc:Fallback xmlns="">
           <p:sp>
             <p:nvSpPr>
               <p:cNvPr id="22" name="TextBox 21">
@@ -15877,8 +15872,8 @@
           </a:p>
         </p:txBody>
       </p:sp>
-      <mc:AlternateContent xmlns:mc="http://schemas.openxmlformats.org/markup-compatibility/2006">
-        <mc:Choice xmlns:a14="http://schemas.microsoft.com/office/drawing/2010/main" Requires="a14">
+      <mc:AlternateContent xmlns:mc="http://schemas.openxmlformats.org/markup-compatibility/2006" xmlns:a14="http://schemas.microsoft.com/office/drawing/2010/main">
+        <mc:Choice Requires="a14">
           <p:sp>
             <p:nvSpPr>
               <p:cNvPr id="5" name="Объект 4">
@@ -16085,7 +16080,7 @@
             </p:txBody>
           </p:sp>
         </mc:Choice>
-        <mc:Fallback>
+        <mc:Fallback xmlns="">
           <p:sp>
             <p:nvSpPr>
               <p:cNvPr id="5" name="Объект 4">

</xml_diff>